<commit_message>
add greensboro presentation files
</commit_message>
<xml_diff>
--- a/2020-01 Greensboro PSUG - Intro to VSCode/Intro to VSCode.pptx
+++ b/2020-01 Greensboro PSUG - Intro to VSCode/Intro to VSCode.pptx
@@ -107,6 +107,11 @@
       </a:defRPr>
     </a:lvl9pPr>
   </p:defaultTextStyle>
+  <p:extLst>
+    <p:ext uri="{EFAFB233-063F-42B5-8137-9DF3F51BA10A}">
+      <p15:sldGuideLst xmlns:p15="http://schemas.microsoft.com/office/powerpoint/2012/main"/>
+    </p:ext>
+  </p:extLst>
 </p:presentation>
 </file>
 
@@ -257,7 +262,7 @@
           <a:p>
             <a:fld id="{27A0DB3D-9688-4BF8-A3F7-0F8DD38F2E37}" type="datetimeFigureOut">
               <a:rPr lang="en-US" smtClean="0"/>
-              <a:t>1/22/2020</a:t>
+              <a:t>1/23/2020</a:t>
             </a:fld>
             <a:endParaRPr lang="en-US"/>
           </a:p>
@@ -455,7 +460,7 @@
           <a:p>
             <a:fld id="{27A0DB3D-9688-4BF8-A3F7-0F8DD38F2E37}" type="datetimeFigureOut">
               <a:rPr lang="en-US" smtClean="0"/>
-              <a:t>1/22/2020</a:t>
+              <a:t>1/23/2020</a:t>
             </a:fld>
             <a:endParaRPr lang="en-US"/>
           </a:p>
@@ -663,7 +668,7 @@
           <a:p>
             <a:fld id="{27A0DB3D-9688-4BF8-A3F7-0F8DD38F2E37}" type="datetimeFigureOut">
               <a:rPr lang="en-US" smtClean="0"/>
-              <a:t>1/22/2020</a:t>
+              <a:t>1/23/2020</a:t>
             </a:fld>
             <a:endParaRPr lang="en-US"/>
           </a:p>
@@ -861,7 +866,7 @@
           <a:p>
             <a:fld id="{27A0DB3D-9688-4BF8-A3F7-0F8DD38F2E37}" type="datetimeFigureOut">
               <a:rPr lang="en-US" smtClean="0"/>
-              <a:t>1/22/2020</a:t>
+              <a:t>1/23/2020</a:t>
             </a:fld>
             <a:endParaRPr lang="en-US"/>
           </a:p>
@@ -1136,7 +1141,7 @@
           <a:p>
             <a:fld id="{27A0DB3D-9688-4BF8-A3F7-0F8DD38F2E37}" type="datetimeFigureOut">
               <a:rPr lang="en-US" smtClean="0"/>
-              <a:t>1/22/2020</a:t>
+              <a:t>1/23/2020</a:t>
             </a:fld>
             <a:endParaRPr lang="en-US"/>
           </a:p>
@@ -1401,7 +1406,7 @@
           <a:p>
             <a:fld id="{27A0DB3D-9688-4BF8-A3F7-0F8DD38F2E37}" type="datetimeFigureOut">
               <a:rPr lang="en-US" smtClean="0"/>
-              <a:t>1/22/2020</a:t>
+              <a:t>1/23/2020</a:t>
             </a:fld>
             <a:endParaRPr lang="en-US"/>
           </a:p>
@@ -1813,7 +1818,7 @@
           <a:p>
             <a:fld id="{27A0DB3D-9688-4BF8-A3F7-0F8DD38F2E37}" type="datetimeFigureOut">
               <a:rPr lang="en-US" smtClean="0"/>
-              <a:t>1/22/2020</a:t>
+              <a:t>1/23/2020</a:t>
             </a:fld>
             <a:endParaRPr lang="en-US"/>
           </a:p>
@@ -1954,7 +1959,7 @@
           <a:p>
             <a:fld id="{27A0DB3D-9688-4BF8-A3F7-0F8DD38F2E37}" type="datetimeFigureOut">
               <a:rPr lang="en-US" smtClean="0"/>
-              <a:t>1/22/2020</a:t>
+              <a:t>1/23/2020</a:t>
             </a:fld>
             <a:endParaRPr lang="en-US"/>
           </a:p>
@@ -2067,7 +2072,7 @@
           <a:p>
             <a:fld id="{27A0DB3D-9688-4BF8-A3F7-0F8DD38F2E37}" type="datetimeFigureOut">
               <a:rPr lang="en-US" smtClean="0"/>
-              <a:t>1/22/2020</a:t>
+              <a:t>1/23/2020</a:t>
             </a:fld>
             <a:endParaRPr lang="en-US"/>
           </a:p>
@@ -2378,7 +2383,7 @@
           <a:p>
             <a:fld id="{27A0DB3D-9688-4BF8-A3F7-0F8DD38F2E37}" type="datetimeFigureOut">
               <a:rPr lang="en-US" smtClean="0"/>
-              <a:t>1/22/2020</a:t>
+              <a:t>1/23/2020</a:t>
             </a:fld>
             <a:endParaRPr lang="en-US"/>
           </a:p>
@@ -2666,7 +2671,7 @@
           <a:p>
             <a:fld id="{27A0DB3D-9688-4BF8-A3F7-0F8DD38F2E37}" type="datetimeFigureOut">
               <a:rPr lang="en-US" smtClean="0"/>
-              <a:t>1/22/2020</a:t>
+              <a:t>1/23/2020</a:t>
             </a:fld>
             <a:endParaRPr lang="en-US"/>
           </a:p>
@@ -2907,7 +2912,7 @@
           <a:p>
             <a:fld id="{27A0DB3D-9688-4BF8-A3F7-0F8DD38F2E37}" type="datetimeFigureOut">
               <a:rPr lang="en-US" smtClean="0"/>
-              <a:t>1/22/2020</a:t>
+              <a:t>1/23/2020</a:t>
             </a:fld>
             <a:endParaRPr lang="en-US"/>
           </a:p>
@@ -3383,7 +3388,7 @@
         <p:spPr>
           <a:xfrm>
             <a:off x="0" y="0"/>
-            <a:ext cx="6096000" cy="6937695"/>
+            <a:ext cx="6096000" cy="6858000"/>
           </a:xfrm>
           <a:prstGeom prst="rect">
             <a:avLst/>
@@ -3553,124 +3558,6 @@
           </a:p>
         </p:txBody>
       </p:sp>
-      <p:sp>
-        <p:nvSpPr>
-          <p:cNvPr id="5" name="TextBox 4">
-            <a:extLst>
-              <a:ext uri="{FF2B5EF4-FFF2-40B4-BE49-F238E27FC236}">
-                <a16:creationId xmlns:a16="http://schemas.microsoft.com/office/drawing/2014/main" id="{C7EBC480-D23A-4BF3-B59B-5C7C102CCA30}"/>
-              </a:ext>
-            </a:extLst>
-          </p:cNvPr>
-          <p:cNvSpPr txBox="1"/>
-          <p:nvPr/>
-        </p:nvSpPr>
-        <p:spPr>
-          <a:xfrm>
-            <a:off x="4737463" y="2837951"/>
-            <a:ext cx="6616338" cy="1938992"/>
-          </a:xfrm>
-          <a:prstGeom prst="rect">
-            <a:avLst/>
-          </a:prstGeom>
-          <a:noFill/>
-        </p:spPr>
-        <p:txBody>
-          <a:bodyPr wrap="square" rtlCol="0">
-            <a:spAutoFit/>
-          </a:bodyPr>
-          <a:lstStyle/>
-          <a:p>
-            <a:pPr marL="342900" indent="-342900">
-              <a:buFont typeface="Arial" panose="020B0604020202020204" pitchFamily="34" charset="0"/>
-              <a:buChar char="•"/>
-            </a:pPr>
-            <a:endParaRPr lang="en-US" sz="2000" dirty="0"/>
-          </a:p>
-          <a:p>
-            <a:pPr marL="342900" indent="-342900">
-              <a:buFont typeface="Arial" panose="020B0604020202020204" pitchFamily="34" charset="0"/>
-              <a:buChar char="•"/>
-            </a:pPr>
-            <a:r>
-              <a:rPr lang="en-US" sz="2000" dirty="0">
-                <a:latin typeface="Abadi" panose="020B0604020202020204" pitchFamily="34" charset="0"/>
-                <a:cs typeface="Times New Roman" panose="02020603050405020304" pitchFamily="18" charset="0"/>
-              </a:rPr>
-              <a:t>Twitter: 		@</a:t>
-            </a:r>
-            <a:r>
-              <a:rPr lang="en-US" sz="2000" dirty="0" err="1">
-                <a:latin typeface="Abadi" panose="020B0604020202020204" pitchFamily="34" charset="0"/>
-                <a:cs typeface="Times New Roman" panose="02020603050405020304" pitchFamily="18" charset="0"/>
-              </a:rPr>
-              <a:t>MikeKanakos</a:t>
-            </a:r>
-            <a:endParaRPr lang="en-US" sz="2000" dirty="0">
-              <a:latin typeface="Abadi" panose="020B0604020202020204" pitchFamily="34" charset="0"/>
-              <a:cs typeface="Times New Roman" panose="02020603050405020304" pitchFamily="18" charset="0"/>
-            </a:endParaRPr>
-          </a:p>
-          <a:p>
-            <a:pPr marL="342900" indent="-342900">
-              <a:buFont typeface="Arial" panose="020B0604020202020204" pitchFamily="34" charset="0"/>
-              <a:buChar char="•"/>
-            </a:pPr>
-            <a:r>
-              <a:rPr lang="en-US" sz="2000" dirty="0">
-                <a:latin typeface="Abadi" panose="020B0604020202020204" pitchFamily="34" charset="0"/>
-                <a:cs typeface="Times New Roman" panose="02020603050405020304" pitchFamily="18" charset="0"/>
-              </a:rPr>
-              <a:t>Email:		mkanakos@gmail.com</a:t>
-            </a:r>
-          </a:p>
-          <a:p>
-            <a:pPr marL="342900" indent="-342900">
-              <a:buFont typeface="Arial" panose="020B0604020202020204" pitchFamily="34" charset="0"/>
-              <a:buChar char="•"/>
-            </a:pPr>
-            <a:r>
-              <a:rPr lang="en-US" sz="2000" dirty="0">
-                <a:latin typeface="Abadi" panose="020B0604020202020204" pitchFamily="34" charset="0"/>
-                <a:cs typeface="Times New Roman" panose="02020603050405020304" pitchFamily="18" charset="0"/>
-              </a:rPr>
-              <a:t>GitHub:		github.com/compwiz32</a:t>
-            </a:r>
-          </a:p>
-          <a:p>
-            <a:pPr marL="342900" indent="-342900">
-              <a:buFont typeface="Arial" panose="020B0604020202020204" pitchFamily="34" charset="0"/>
-              <a:buChar char="•"/>
-            </a:pPr>
-            <a:r>
-              <a:rPr lang="en-US" sz="2000" dirty="0">
-                <a:latin typeface="Abadi" panose="020B0604020202020204" pitchFamily="34" charset="0"/>
-                <a:cs typeface="Times New Roman" panose="02020603050405020304" pitchFamily="18" charset="0"/>
-              </a:rPr>
-              <a:t>Blog: 		</a:t>
-            </a:r>
-            <a:r>
-              <a:rPr lang="en-US" sz="2000" dirty="0">
-                <a:latin typeface="Abadi" panose="020B0604020202020204" pitchFamily="34" charset="0"/>
-                <a:cs typeface="Times New Roman" panose="02020603050405020304" pitchFamily="18" charset="0"/>
-                <a:hlinkClick r:id="rId2"/>
-              </a:rPr>
-              <a:t>www.networkadm.in</a:t>
-            </a:r>
-            <a:endParaRPr lang="en-US" sz="2000" dirty="0">
-              <a:latin typeface="Abadi" panose="020B0604020202020204" pitchFamily="34" charset="0"/>
-              <a:cs typeface="Times New Roman" panose="02020603050405020304" pitchFamily="18" charset="0"/>
-            </a:endParaRPr>
-          </a:p>
-          <a:p>
-            <a:pPr marL="342900" indent="-342900">
-              <a:buFont typeface="Arial" panose="020B0604020202020204" pitchFamily="34" charset="0"/>
-              <a:buChar char="•"/>
-            </a:pPr>
-            <a:endParaRPr lang="en-US" sz="2000" dirty="0"/>
-          </a:p>
-        </p:txBody>
-      </p:sp>
       <p:pic>
         <p:nvPicPr>
           <p:cNvPr id="6" name="Picture 5">
@@ -3686,7 +3573,7 @@
           <p:nvPr/>
         </p:nvPicPr>
         <p:blipFill rotWithShape="1">
-          <a:blip r:embed="rId3"/>
+          <a:blip r:embed="rId2"/>
           <a:srcRect l="604"/>
           <a:stretch/>
         </p:blipFill>
@@ -3829,37 +3716,212 @@
                   <a:schemeClr val="bg1"/>
                 </a:solidFill>
               </a:rPr>
-              <a:t>$</a:t>
-            </a:r>
-            <a:r>
-              <a:rPr lang="en-US" sz="4800" b="1" dirty="0" err="1">
+              <a:t>Tonight’s Speakers</a:t>
+            </a:r>
+          </a:p>
+        </p:txBody>
+      </p:sp>
+      <p:pic>
+        <p:nvPicPr>
+          <p:cNvPr id="1026" name="Picture 2" descr="https://pbs.twimg.com/profile_images/1052706201102901249/UC3kKnfb_400x400.jpg">
+            <a:extLst>
+              <a:ext uri="{FF2B5EF4-FFF2-40B4-BE49-F238E27FC236}">
+                <a16:creationId xmlns:a16="http://schemas.microsoft.com/office/drawing/2014/main" id="{69E382C5-7B55-4EBD-88E0-6C916A3C174B}"/>
+              </a:ext>
+            </a:extLst>
+          </p:cNvPr>
+          <p:cNvPicPr>
+            <a:picLocks noChangeAspect="1" noChangeArrowheads="1"/>
+          </p:cNvPicPr>
+          <p:nvPr/>
+        </p:nvPicPr>
+        <p:blipFill>
+          <a:blip r:embed="rId3">
+            <a:extLst>
+              <a:ext uri="{28A0092B-C50C-407E-A947-70E740481C1C}">
+                <a14:useLocalDpi xmlns:a14="http://schemas.microsoft.com/office/drawing/2010/main" val="0"/>
+              </a:ext>
+            </a:extLst>
+          </a:blip>
+          <a:srcRect/>
+          <a:stretch>
+            <a:fillRect/>
+          </a:stretch>
+        </p:blipFill>
+        <p:spPr bwMode="auto">
+          <a:xfrm>
+            <a:off x="4721706" y="2586663"/>
+            <a:ext cx="2564177" cy="2564177"/>
+          </a:xfrm>
+          <a:prstGeom prst="rect">
+            <a:avLst/>
+          </a:prstGeom>
+          <a:noFill/>
+          <a:extLst>
+            <a:ext uri="{909E8E84-426E-40DD-AFC4-6F175D3DCCD1}">
+              <a14:hiddenFill xmlns:a14="http://schemas.microsoft.com/office/drawing/2010/main">
                 <a:solidFill>
-                  <a:schemeClr val="bg1"/>
+                  <a:srgbClr val="FFFFFF"/>
                 </a:solidFill>
-              </a:rPr>
-              <a:t>AboutMe</a:t>
-            </a:r>
-            <a:r>
-              <a:rPr lang="en-US" sz="4800" b="1" dirty="0">
+              </a14:hiddenFill>
+            </a:ext>
+          </a:extLst>
+        </p:spPr>
+      </p:pic>
+      <p:pic>
+        <p:nvPicPr>
+          <p:cNvPr id="1028" name="Picture 4" descr="https://pbs.twimg.com/profile_images/1131934538966405120/iQpinZgM_400x400.png">
+            <a:extLst>
+              <a:ext uri="{FF2B5EF4-FFF2-40B4-BE49-F238E27FC236}">
+                <a16:creationId xmlns:a16="http://schemas.microsoft.com/office/drawing/2014/main" id="{E3FEA25E-6BDF-4D27-B053-783C4F3259C3}"/>
+              </a:ext>
+            </a:extLst>
+          </p:cNvPr>
+          <p:cNvPicPr>
+            <a:picLocks noChangeAspect="1" noChangeArrowheads="1"/>
+          </p:cNvPicPr>
+          <p:nvPr/>
+        </p:nvPicPr>
+        <p:blipFill>
+          <a:blip r:embed="rId4">
+            <a:extLst>
+              <a:ext uri="{28A0092B-C50C-407E-A947-70E740481C1C}">
+                <a14:useLocalDpi xmlns:a14="http://schemas.microsoft.com/office/drawing/2010/main" val="0"/>
+              </a:ext>
+            </a:extLst>
+          </a:blip>
+          <a:srcRect/>
+          <a:stretch>
+            <a:fillRect/>
+          </a:stretch>
+        </p:blipFill>
+        <p:spPr bwMode="auto">
+          <a:xfrm>
+            <a:off x="8396480" y="2596743"/>
+            <a:ext cx="2554097" cy="2554097"/>
+          </a:xfrm>
+          <a:prstGeom prst="rect">
+            <a:avLst/>
+          </a:prstGeom>
+          <a:noFill/>
+          <a:extLst>
+            <a:ext uri="{909E8E84-426E-40DD-AFC4-6F175D3DCCD1}">
+              <a14:hiddenFill xmlns:a14="http://schemas.microsoft.com/office/drawing/2010/main">
                 <a:solidFill>
-                  <a:schemeClr val="bg1"/>
+                  <a:srgbClr val="FFFFFF"/>
                 </a:solidFill>
-              </a:rPr>
-              <a:t> = Get-</a:t>
-            </a:r>
-            <a:r>
-              <a:rPr lang="en-US" sz="4800" b="1" dirty="0" err="1">
-                <a:solidFill>
-                  <a:schemeClr val="bg1"/>
-                </a:solidFill>
-              </a:rPr>
-              <a:t>SpeakerInfo</a:t>
-            </a:r>
-            <a:endParaRPr lang="en-US" sz="4800" b="1" dirty="0">
-              <a:solidFill>
-                <a:schemeClr val="bg1"/>
-              </a:solidFill>
-            </a:endParaRPr>
+              </a14:hiddenFill>
+            </a:ext>
+          </a:extLst>
+        </p:spPr>
+      </p:pic>
+      <p:sp>
+        <p:nvSpPr>
+          <p:cNvPr id="3" name="TextBox 2">
+            <a:extLst>
+              <a:ext uri="{FF2B5EF4-FFF2-40B4-BE49-F238E27FC236}">
+                <a16:creationId xmlns:a16="http://schemas.microsoft.com/office/drawing/2014/main" id="{F442E058-68DD-468C-9C24-4744AD5C679A}"/>
+              </a:ext>
+            </a:extLst>
+          </p:cNvPr>
+          <p:cNvSpPr txBox="1"/>
+          <p:nvPr/>
+        </p:nvSpPr>
+        <p:spPr>
+          <a:xfrm>
+            <a:off x="1552437" y="5645020"/>
+            <a:ext cx="1563248" cy="369332"/>
+          </a:xfrm>
+          <a:prstGeom prst="rect">
+            <a:avLst/>
+          </a:prstGeom>
+          <a:noFill/>
+        </p:spPr>
+        <p:txBody>
+          <a:bodyPr wrap="none" rtlCol="0">
+            <a:spAutoFit/>
+          </a:bodyPr>
+          <a:lstStyle/>
+          <a:p>
+            <a:r>
+              <a:rPr lang="en-US" dirty="0"/>
+              <a:t>Mike Kanakos</a:t>
+            </a:r>
+          </a:p>
+        </p:txBody>
+      </p:sp>
+      <p:sp>
+        <p:nvSpPr>
+          <p:cNvPr id="10" name="TextBox 9">
+            <a:extLst>
+              <a:ext uri="{FF2B5EF4-FFF2-40B4-BE49-F238E27FC236}">
+                <a16:creationId xmlns:a16="http://schemas.microsoft.com/office/drawing/2014/main" id="{3E3B0220-C314-4FF9-9678-CA1E2542E1DE}"/>
+              </a:ext>
+            </a:extLst>
+          </p:cNvPr>
+          <p:cNvSpPr txBox="1"/>
+          <p:nvPr/>
+        </p:nvSpPr>
+        <p:spPr>
+          <a:xfrm>
+            <a:off x="5314376" y="5645020"/>
+            <a:ext cx="1510735" cy="369332"/>
+          </a:xfrm>
+          <a:prstGeom prst="rect">
+            <a:avLst/>
+          </a:prstGeom>
+          <a:noFill/>
+        </p:spPr>
+        <p:txBody>
+          <a:bodyPr wrap="none" rtlCol="0">
+            <a:spAutoFit/>
+          </a:bodyPr>
+          <a:lstStyle/>
+          <a:p>
+            <a:r>
+              <a:rPr lang="en-US" dirty="0"/>
+              <a:t>Phil </a:t>
+            </a:r>
+            <a:r>
+              <a:rPr lang="en-US" dirty="0" err="1"/>
+              <a:t>Bossman</a:t>
+            </a:r>
+            <a:endParaRPr lang="en-US" dirty="0"/>
+          </a:p>
+        </p:txBody>
+      </p:sp>
+      <p:sp>
+        <p:nvSpPr>
+          <p:cNvPr id="11" name="TextBox 10">
+            <a:extLst>
+              <a:ext uri="{FF2B5EF4-FFF2-40B4-BE49-F238E27FC236}">
+                <a16:creationId xmlns:a16="http://schemas.microsoft.com/office/drawing/2014/main" id="{C7108880-5E1B-4342-B440-7DE542030971}"/>
+              </a:ext>
+            </a:extLst>
+          </p:cNvPr>
+          <p:cNvSpPr txBox="1"/>
+          <p:nvPr/>
+        </p:nvSpPr>
+        <p:spPr>
+          <a:xfrm>
+            <a:off x="9026972" y="5645020"/>
+            <a:ext cx="1293111" cy="369332"/>
+          </a:xfrm>
+          <a:prstGeom prst="rect">
+            <a:avLst/>
+          </a:prstGeom>
+          <a:noFill/>
+        </p:spPr>
+        <p:txBody>
+          <a:bodyPr wrap="none" rtlCol="0">
+            <a:spAutoFit/>
+          </a:bodyPr>
+          <a:lstStyle/>
+          <a:p>
+            <a:r>
+              <a:rPr lang="en-US" dirty="0"/>
+              <a:t>Kevin Laux</a:t>
+            </a:r>
           </a:p>
         </p:txBody>
       </p:sp>

</xml_diff>